<commit_message>
Updates to module 3 presentations. remove comment.
</commit_message>
<xml_diff>
--- a/LectureFiles/cshl/2016/RNASeq_Module3_Tutorial.pptx
+++ b/LectureFiles/cshl/2016/RNASeq_Module3_Tutorial.pptx
@@ -1932,14 +1932,6 @@
           </a:bodyPr>
           <a:lstStyle/>
           <a:p>
-            <a:r>
-              <a:rPr lang="en-US" dirty="0" smtClean="0">
-                <a:latin typeface="Calibri" charset="0"/>
-                <a:ea typeface="ＭＳ Ｐゴシック" charset="0"/>
-                <a:cs typeface="ＭＳ Ｐゴシック" charset="0"/>
-              </a:rPr>
-              <a:t>TODO: Update the figures.</a:t>
-            </a:r>
             <a:endParaRPr lang="en-US" dirty="0">
               <a:latin typeface="Calibri" charset="0"/>
               <a:ea typeface="ＭＳ Ｐゴシック" charset="0"/>

</xml_diff>